<commit_message>
Adjust slides and some addtional classes
</commit_message>
<xml_diff>
--- a/reports/Presentation.pptx
+++ b/reports/Presentation.pptx
@@ -5,7 +5,7 @@
     <p:sldMasterId id="2147483699" r:id="rId1"/>
   </p:sldMasterIdLst>
   <p:notesMasterIdLst>
-    <p:notesMasterId r:id="rId15"/>
+    <p:notesMasterId r:id="rId17"/>
   </p:notesMasterIdLst>
   <p:sldIdLst>
     <p:sldId id="256" r:id="rId2"/>
@@ -18,28 +18,30 @@
     <p:sldId id="351" r:id="rId9"/>
     <p:sldId id="263" r:id="rId10"/>
     <p:sldId id="356" r:id="rId11"/>
-    <p:sldId id="352" r:id="rId12"/>
-    <p:sldId id="357" r:id="rId13"/>
-    <p:sldId id="358" r:id="rId14"/>
+    <p:sldId id="359" r:id="rId12"/>
+    <p:sldId id="352" r:id="rId13"/>
+    <p:sldId id="357" r:id="rId14"/>
+    <p:sldId id="360" r:id="rId15"/>
+    <p:sldId id="358" r:id="rId16"/>
   </p:sldIdLst>
   <p:sldSz cx="9144000" cy="5143500" type="screen16x9"/>
   <p:notesSz cx="6858000" cy="9144000"/>
   <p:embeddedFontLst>
     <p:embeddedFont>
       <p:font typeface="Hammersmith One" panose="020B0604020202020204" charset="0"/>
-      <p:regular r:id="rId16"/>
+      <p:regular r:id="rId18"/>
     </p:embeddedFont>
     <p:embeddedFont>
       <p:font typeface="Roboto Condensed Light" panose="02000000000000000000" pitchFamily="2" charset="0"/>
-      <p:regular r:id="rId17"/>
-      <p:italic r:id="rId18"/>
+      <p:regular r:id="rId19"/>
+      <p:italic r:id="rId20"/>
     </p:embeddedFont>
     <p:embeddedFont>
       <p:font typeface="Ubuntu" panose="020B0604020202020204" charset="0"/>
-      <p:regular r:id="rId19"/>
-      <p:bold r:id="rId20"/>
-      <p:italic r:id="rId21"/>
-      <p:boldItalic r:id="rId22"/>
+      <p:regular r:id="rId21"/>
+      <p:bold r:id="rId22"/>
+      <p:italic r:id="rId23"/>
+      <p:boldItalic r:id="rId24"/>
     </p:embeddedFont>
   </p:embeddedFontLst>
   <p:defaultTextStyle>
@@ -938,6 +940,115 @@
   <p:cSld>
     <p:spTree>
       <p:nvGrpSpPr>
+        <p:cNvPr id="1" name="Shape 1378"/>
+        <p:cNvGrpSpPr/>
+        <p:nvPr/>
+      </p:nvGrpSpPr>
+      <p:grpSpPr>
+        <a:xfrm>
+          <a:off x="0" y="0"/>
+          <a:ext cx="0" cy="0"/>
+          <a:chOff x="0" y="0"/>
+          <a:chExt cx="0" cy="0"/>
+        </a:xfrm>
+      </p:grpSpPr>
+      <p:sp>
+        <p:nvSpPr>
+          <p:cNvPr id="1379" name="Google Shape;1379;gc6a01074ef_0_21525:notes"/>
+          <p:cNvSpPr>
+            <a:spLocks noGrp="1" noRot="1" noChangeAspect="1"/>
+          </p:cNvSpPr>
+          <p:nvPr>
+            <p:ph type="sldImg" idx="2"/>
+          </p:nvPr>
+        </p:nvSpPr>
+        <p:spPr>
+          <a:xfrm>
+            <a:off x="381000" y="685800"/>
+            <a:ext cx="6096000" cy="3429000"/>
+          </a:xfrm>
+          <a:custGeom>
+            <a:avLst/>
+            <a:gdLst/>
+            <a:ahLst/>
+            <a:cxnLst/>
+            <a:rect l="l" t="t" r="r" b="b"/>
+            <a:pathLst>
+              <a:path w="120000" h="120000" extrusionOk="0">
+                <a:moveTo>
+                  <a:pt x="0" y="0"/>
+                </a:moveTo>
+                <a:lnTo>
+                  <a:pt x="120000" y="0"/>
+                </a:lnTo>
+                <a:lnTo>
+                  <a:pt x="120000" y="120000"/>
+                </a:lnTo>
+                <a:lnTo>
+                  <a:pt x="0" y="120000"/>
+                </a:lnTo>
+                <a:close/>
+              </a:path>
+            </a:pathLst>
+          </a:custGeom>
+        </p:spPr>
+      </p:sp>
+      <p:sp>
+        <p:nvSpPr>
+          <p:cNvPr id="1380" name="Google Shape;1380;gc6a01074ef_0_21525:notes"/>
+          <p:cNvSpPr txBox="1">
+            <a:spLocks noGrp="1"/>
+          </p:cNvSpPr>
+          <p:nvPr>
+            <p:ph type="body" idx="1"/>
+          </p:nvPr>
+        </p:nvSpPr>
+        <p:spPr>
+          <a:xfrm>
+            <a:off x="685800" y="4343400"/>
+            <a:ext cx="5486400" cy="4114800"/>
+          </a:xfrm>
+          <a:prstGeom prst="rect">
+            <a:avLst/>
+          </a:prstGeom>
+        </p:spPr>
+        <p:txBody>
+          <a:bodyPr spcFirstLastPara="1" wrap="square" lIns="91425" tIns="91425" rIns="91425" bIns="91425" anchor="t" anchorCtr="0">
+            <a:noAutofit/>
+          </a:bodyPr>
+          <a:lstStyle/>
+          <a:p>
+            <a:pPr marL="0" lvl="0" indent="0" algn="l" rtl="0">
+              <a:spcBef>
+                <a:spcPts val="0"/>
+              </a:spcBef>
+              <a:spcAft>
+                <a:spcPts val="0"/>
+              </a:spcAft>
+              <a:buNone/>
+            </a:pPr>
+            <a:endParaRPr/>
+          </a:p>
+        </p:txBody>
+      </p:sp>
+    </p:spTree>
+    <p:extLst>
+      <p:ext uri="{BB962C8B-B14F-4D97-AF65-F5344CB8AC3E}">
+        <p14:creationId xmlns:p14="http://schemas.microsoft.com/office/powerpoint/2010/main" val="255051804"/>
+      </p:ext>
+    </p:extLst>
+  </p:cSld>
+  <p:clrMapOvr>
+    <a:masterClrMapping/>
+  </p:clrMapOvr>
+</p:notes>
+</file>
+
+<file path=ppt/notesSlides/notesSlide12.xml><?xml version="1.0" encoding="utf-8"?>
+<p:notes xmlns:a="http://schemas.openxmlformats.org/drawingml/2006/main" xmlns:r="http://schemas.openxmlformats.org/officeDocument/2006/relationships" xmlns:p="http://schemas.openxmlformats.org/presentationml/2006/main" showMasterSp="0" showMasterPhAnim="0">
+  <p:cSld>
+    <p:spTree>
+      <p:nvGrpSpPr>
         <p:cNvPr id="1" name="Shape 1351"/>
         <p:cNvGrpSpPr/>
         <p:nvPr/>
@@ -1042,7 +1153,7 @@
 </p:notes>
 </file>
 
-<file path=ppt/notesSlides/notesSlide12.xml><?xml version="1.0" encoding="utf-8"?>
+<file path=ppt/notesSlides/notesSlide13.xml><?xml version="1.0" encoding="utf-8"?>
 <p:notes xmlns:a="http://schemas.openxmlformats.org/drawingml/2006/main" xmlns:r="http://schemas.openxmlformats.org/officeDocument/2006/relationships" xmlns:p="http://schemas.openxmlformats.org/presentationml/2006/main" showMasterSp="0" showMasterPhAnim="0">
   <p:cSld>
     <p:spTree>
@@ -1151,7 +1262,116 @@
 </p:notes>
 </file>
 
-<file path=ppt/notesSlides/notesSlide13.xml><?xml version="1.0" encoding="utf-8"?>
+<file path=ppt/notesSlides/notesSlide14.xml><?xml version="1.0" encoding="utf-8"?>
+<p:notes xmlns:a="http://schemas.openxmlformats.org/drawingml/2006/main" xmlns:r="http://schemas.openxmlformats.org/officeDocument/2006/relationships" xmlns:p="http://schemas.openxmlformats.org/presentationml/2006/main" showMasterSp="0" showMasterPhAnim="0">
+  <p:cSld>
+    <p:spTree>
+      <p:nvGrpSpPr>
+        <p:cNvPr id="1" name="Shape 1351"/>
+        <p:cNvGrpSpPr/>
+        <p:nvPr/>
+      </p:nvGrpSpPr>
+      <p:grpSpPr>
+        <a:xfrm>
+          <a:off x="0" y="0"/>
+          <a:ext cx="0" cy="0"/>
+          <a:chOff x="0" y="0"/>
+          <a:chExt cx="0" cy="0"/>
+        </a:xfrm>
+      </p:grpSpPr>
+      <p:sp>
+        <p:nvSpPr>
+          <p:cNvPr id="1352" name="Google Shape;1352;gc33250489b_0_147:notes"/>
+          <p:cNvSpPr>
+            <a:spLocks noGrp="1" noRot="1" noChangeAspect="1"/>
+          </p:cNvSpPr>
+          <p:nvPr>
+            <p:ph type="sldImg" idx="2"/>
+          </p:nvPr>
+        </p:nvSpPr>
+        <p:spPr>
+          <a:xfrm>
+            <a:off x="381000" y="685800"/>
+            <a:ext cx="6096000" cy="3429000"/>
+          </a:xfrm>
+          <a:custGeom>
+            <a:avLst/>
+            <a:gdLst/>
+            <a:ahLst/>
+            <a:cxnLst/>
+            <a:rect l="l" t="t" r="r" b="b"/>
+            <a:pathLst>
+              <a:path w="120000" h="120000" extrusionOk="0">
+                <a:moveTo>
+                  <a:pt x="0" y="0"/>
+                </a:moveTo>
+                <a:lnTo>
+                  <a:pt x="120000" y="0"/>
+                </a:lnTo>
+                <a:lnTo>
+                  <a:pt x="120000" y="120000"/>
+                </a:lnTo>
+                <a:lnTo>
+                  <a:pt x="0" y="120000"/>
+                </a:lnTo>
+                <a:close/>
+              </a:path>
+            </a:pathLst>
+          </a:custGeom>
+        </p:spPr>
+      </p:sp>
+      <p:sp>
+        <p:nvSpPr>
+          <p:cNvPr id="1353" name="Google Shape;1353;gc33250489b_0_147:notes"/>
+          <p:cNvSpPr txBox="1">
+            <a:spLocks noGrp="1"/>
+          </p:cNvSpPr>
+          <p:nvPr>
+            <p:ph type="body" idx="1"/>
+          </p:nvPr>
+        </p:nvSpPr>
+        <p:spPr>
+          <a:xfrm>
+            <a:off x="685800" y="4343400"/>
+            <a:ext cx="5486400" cy="4114800"/>
+          </a:xfrm>
+          <a:prstGeom prst="rect">
+            <a:avLst/>
+          </a:prstGeom>
+        </p:spPr>
+        <p:txBody>
+          <a:bodyPr spcFirstLastPara="1" wrap="square" lIns="91425" tIns="91425" rIns="91425" bIns="91425" anchor="t" anchorCtr="0">
+            <a:noAutofit/>
+          </a:bodyPr>
+          <a:lstStyle/>
+          <a:p>
+            <a:pPr marL="0" lvl="0" indent="0" algn="l" rtl="0">
+              <a:spcBef>
+                <a:spcPts val="0"/>
+              </a:spcBef>
+              <a:spcAft>
+                <a:spcPts val="0"/>
+              </a:spcAft>
+              <a:buNone/>
+            </a:pPr>
+            <a:endParaRPr/>
+          </a:p>
+        </p:txBody>
+      </p:sp>
+    </p:spTree>
+    <p:extLst>
+      <p:ext uri="{BB962C8B-B14F-4D97-AF65-F5344CB8AC3E}">
+        <p14:creationId xmlns:p14="http://schemas.microsoft.com/office/powerpoint/2010/main" val="272581050"/>
+      </p:ext>
+    </p:extLst>
+  </p:cSld>
+  <p:clrMapOvr>
+    <a:masterClrMapping/>
+  </p:clrMapOvr>
+</p:notes>
+</file>
+
+<file path=ppt/notesSlides/notesSlide15.xml><?xml version="1.0" encoding="utf-8"?>
 <p:notes xmlns:a="http://schemas.openxmlformats.org/drawingml/2006/main" xmlns:r="http://schemas.openxmlformats.org/officeDocument/2006/relationships" xmlns:p="http://schemas.openxmlformats.org/presentationml/2006/main" showMasterSp="0" showMasterPhAnim="0">
   <p:cSld>
     <p:spTree>
@@ -23833,6 +24053,230 @@
   <p:cSld>
     <p:spTree>
       <p:nvGrpSpPr>
+        <p:cNvPr id="1" name="Shape 1381"/>
+        <p:cNvGrpSpPr/>
+        <p:nvPr/>
+      </p:nvGrpSpPr>
+      <p:grpSpPr>
+        <a:xfrm>
+          <a:off x="0" y="0"/>
+          <a:ext cx="0" cy="0"/>
+          <a:chOff x="0" y="0"/>
+          <a:chExt cx="0" cy="0"/>
+        </a:xfrm>
+      </p:grpSpPr>
+      <p:sp>
+        <p:nvSpPr>
+          <p:cNvPr id="1382" name="Google Shape;1382;p61"/>
+          <p:cNvSpPr txBox="1">
+            <a:spLocks noGrp="1"/>
+          </p:cNvSpPr>
+          <p:nvPr>
+            <p:ph type="title"/>
+          </p:nvPr>
+        </p:nvSpPr>
+        <p:spPr>
+          <a:xfrm>
+            <a:off x="713250" y="523025"/>
+            <a:ext cx="7717500" cy="541500"/>
+          </a:xfrm>
+          <a:prstGeom prst="rect">
+            <a:avLst/>
+          </a:prstGeom>
+        </p:spPr>
+        <p:txBody>
+          <a:bodyPr spcFirstLastPara="1" wrap="square" lIns="91425" tIns="91425" rIns="91425" bIns="91425" anchor="b" anchorCtr="0">
+            <a:noAutofit/>
+          </a:bodyPr>
+          <a:lstStyle/>
+          <a:p>
+            <a:pPr marL="0" lvl="0" indent="0" algn="ctr" rtl="0">
+              <a:spcBef>
+                <a:spcPts val="0"/>
+              </a:spcBef>
+              <a:spcAft>
+                <a:spcPts val="0"/>
+              </a:spcAft>
+              <a:buNone/>
+            </a:pPr>
+            <a:r>
+              <a:rPr lang="en-US" dirty="0"/>
+              <a:t>SOLID</a:t>
+            </a:r>
+            <a:endParaRPr dirty="0"/>
+          </a:p>
+        </p:txBody>
+      </p:sp>
+      <p:sp>
+        <p:nvSpPr>
+          <p:cNvPr id="1383" name="Google Shape;1383;p61"/>
+          <p:cNvSpPr txBox="1">
+            <a:spLocks noGrp="1"/>
+          </p:cNvSpPr>
+          <p:nvPr>
+            <p:ph type="subTitle" idx="1"/>
+          </p:nvPr>
+        </p:nvSpPr>
+        <p:spPr>
+          <a:xfrm>
+            <a:off x="713250" y="1126100"/>
+            <a:ext cx="7717500" cy="3442800"/>
+          </a:xfrm>
+          <a:prstGeom prst="rect">
+            <a:avLst/>
+          </a:prstGeom>
+        </p:spPr>
+        <p:txBody>
+          <a:bodyPr spcFirstLastPara="1" wrap="square" lIns="91425" tIns="91425" rIns="91425" bIns="91425" anchor="t" anchorCtr="0">
+            <a:noAutofit/>
+          </a:bodyPr>
+          <a:lstStyle/>
+          <a:p>
+            <a:pPr marL="342900" lvl="0" algn="l" rtl="0">
+              <a:spcBef>
+                <a:spcPts val="0"/>
+              </a:spcBef>
+              <a:spcAft>
+                <a:spcPts val="0"/>
+              </a:spcAft>
+              <a:buFont typeface="Wingdings" panose="05000000000000000000" pitchFamily="2" charset="2"/>
+              <a:buChar char="v"/>
+            </a:pPr>
+            <a:r>
+              <a:rPr lang="en-US" sz="2400" dirty="0"/>
+              <a:t>Single responsibility: each method does exactly 1 work, as its name</a:t>
+            </a:r>
+          </a:p>
+          <a:p>
+            <a:pPr marL="342900" lvl="0" algn="l" rtl="0">
+              <a:spcBef>
+                <a:spcPts val="0"/>
+              </a:spcBef>
+              <a:spcAft>
+                <a:spcPts val="0"/>
+              </a:spcAft>
+              <a:buFont typeface="Wingdings" panose="05000000000000000000" pitchFamily="2" charset="2"/>
+              <a:buChar char="v"/>
+            </a:pPr>
+            <a:r>
+              <a:rPr lang="en-US" sz="2400" dirty="0"/>
+              <a:t>Open-closed: Use interfaces and abstract classes</a:t>
+            </a:r>
+          </a:p>
+          <a:p>
+            <a:pPr marL="342900" lvl="0" algn="l" rtl="0">
+              <a:spcBef>
+                <a:spcPts val="0"/>
+              </a:spcBef>
+              <a:spcAft>
+                <a:spcPts val="0"/>
+              </a:spcAft>
+              <a:buFont typeface="Wingdings" panose="05000000000000000000" pitchFamily="2" charset="2"/>
+              <a:buChar char="v"/>
+            </a:pPr>
+            <a:r>
+              <a:rPr lang="en-US" sz="2400" dirty="0" err="1"/>
+              <a:t>Liskov</a:t>
+            </a:r>
+            <a:r>
+              <a:rPr lang="en-US" sz="2400" dirty="0"/>
+              <a:t> substitution: all types of Bikes (Normal bike, </a:t>
+            </a:r>
+            <a:r>
+              <a:rPr lang="en-US" sz="2400" dirty="0" err="1"/>
+              <a:t>Ebike</a:t>
+            </a:r>
+            <a:r>
+              <a:rPr lang="en-US" sz="2400" dirty="0"/>
+              <a:t>) can replace Bike type</a:t>
+            </a:r>
+          </a:p>
+          <a:p>
+            <a:pPr marL="342900" lvl="0" algn="l" rtl="0">
+              <a:spcBef>
+                <a:spcPts val="0"/>
+              </a:spcBef>
+              <a:spcAft>
+                <a:spcPts val="0"/>
+              </a:spcAft>
+              <a:buFont typeface="Wingdings" panose="05000000000000000000" pitchFamily="2" charset="2"/>
+              <a:buChar char="v"/>
+            </a:pPr>
+            <a:r>
+              <a:rPr lang="en-US" sz="2400" dirty="0"/>
+              <a:t>Interface </a:t>
+            </a:r>
+            <a:r>
+              <a:rPr lang="en-US" sz="2400" dirty="0" err="1"/>
+              <a:t>segeration</a:t>
+            </a:r>
+            <a:r>
+              <a:rPr lang="en-US" sz="2400" dirty="0"/>
+              <a:t>: No specific modules</a:t>
+            </a:r>
+          </a:p>
+          <a:p>
+            <a:pPr marL="342900" lvl="0" algn="l" rtl="0">
+              <a:spcBef>
+                <a:spcPts val="0"/>
+              </a:spcBef>
+              <a:spcAft>
+                <a:spcPts val="0"/>
+              </a:spcAft>
+              <a:buFont typeface="Wingdings" panose="05000000000000000000" pitchFamily="2" charset="2"/>
+              <a:buChar char="v"/>
+            </a:pPr>
+            <a:r>
+              <a:rPr lang="en-US" sz="2400" dirty="0"/>
+              <a:t>Dependency inversion: Communicate between subsystem by interfaces</a:t>
+            </a:r>
+          </a:p>
+          <a:p>
+            <a:pPr marL="342900" lvl="0" algn="l" rtl="0">
+              <a:spcBef>
+                <a:spcPts val="0"/>
+              </a:spcBef>
+              <a:spcAft>
+                <a:spcPts val="0"/>
+              </a:spcAft>
+              <a:buFont typeface="Wingdings" panose="05000000000000000000" pitchFamily="2" charset="2"/>
+              <a:buChar char="v"/>
+            </a:pPr>
+            <a:endParaRPr lang="en-US" sz="2400" dirty="0"/>
+          </a:p>
+          <a:p>
+            <a:pPr marL="342900" lvl="0" algn="l" rtl="0">
+              <a:spcBef>
+                <a:spcPts val="0"/>
+              </a:spcBef>
+              <a:spcAft>
+                <a:spcPts val="0"/>
+              </a:spcAft>
+              <a:buFont typeface="Wingdings" panose="05000000000000000000" pitchFamily="2" charset="2"/>
+              <a:buChar char="v"/>
+            </a:pPr>
+            <a:endParaRPr lang="en-US" sz="2400" dirty="0"/>
+          </a:p>
+        </p:txBody>
+      </p:sp>
+    </p:spTree>
+    <p:extLst>
+      <p:ext uri="{BB962C8B-B14F-4D97-AF65-F5344CB8AC3E}">
+        <p14:creationId xmlns:p14="http://schemas.microsoft.com/office/powerpoint/2010/main" val="1018168330"/>
+      </p:ext>
+    </p:extLst>
+  </p:cSld>
+  <p:clrMapOvr>
+    <a:masterClrMapping/>
+  </p:clrMapOvr>
+</p:sld>
+</file>
+
+<file path=ppt/slides/slide12.xml><?xml version="1.0" encoding="utf-8"?>
+<p:sld xmlns:a="http://schemas.openxmlformats.org/drawingml/2006/main" xmlns:r="http://schemas.openxmlformats.org/officeDocument/2006/relationships" xmlns:p="http://schemas.openxmlformats.org/presentationml/2006/main">
+  <p:cSld>
+    <p:spTree>
+      <p:nvGrpSpPr>
         <p:cNvPr id="1" name="Shape 1354"/>
         <p:cNvGrpSpPr/>
         <p:nvPr/>
@@ -24014,7 +24458,7 @@
 </p:sld>
 </file>
 
-<file path=ppt/slides/slide12.xml><?xml version="1.0" encoding="utf-8"?>
+<file path=ppt/slides/slide13.xml><?xml version="1.0" encoding="utf-8"?>
 <p:sld xmlns:a="http://schemas.openxmlformats.org/drawingml/2006/main" xmlns:r="http://schemas.openxmlformats.org/officeDocument/2006/relationships" xmlns:p="http://schemas.openxmlformats.org/presentationml/2006/main">
   <p:cSld>
     <p:spTree>
@@ -24113,6 +24557,54 @@
               <a:t>Singleton: Use one controller of each type for controlling activities of the application</a:t>
             </a:r>
           </a:p>
+          <a:p>
+            <a:pPr marL="342900" lvl="0" algn="l" rtl="0">
+              <a:spcBef>
+                <a:spcPts val="0"/>
+              </a:spcBef>
+              <a:spcAft>
+                <a:spcPts val="0"/>
+              </a:spcAft>
+              <a:buFont typeface="Wingdings" panose="05000000000000000000" pitchFamily="2" charset="2"/>
+              <a:buChar char="v"/>
+            </a:pPr>
+            <a:r>
+              <a:rPr lang="en-US" sz="2400" dirty="0"/>
+              <a:t>Observer: Bike changes will be notified to its corresponding Dock, and Dock changes will be announced to screen handler for display, no need to frequently query the database</a:t>
+            </a:r>
+          </a:p>
+          <a:p>
+            <a:pPr marL="342900" lvl="0" algn="l" rtl="0">
+              <a:spcBef>
+                <a:spcPts val="0"/>
+              </a:spcBef>
+              <a:spcAft>
+                <a:spcPts val="0"/>
+              </a:spcAft>
+              <a:buFont typeface="Wingdings" panose="05000000000000000000" pitchFamily="2" charset="2"/>
+              <a:buChar char="v"/>
+            </a:pPr>
+            <a:r>
+              <a:rPr lang="en-US" sz="2400" dirty="0"/>
+              <a:t>Façade: use interfaces for communication with dependency injection</a:t>
+            </a:r>
+          </a:p>
+          <a:p>
+            <a:pPr marL="342900" lvl="0" algn="l" rtl="0">
+              <a:spcBef>
+                <a:spcPts val="0"/>
+              </a:spcBef>
+              <a:spcAft>
+                <a:spcPts val="0"/>
+              </a:spcAft>
+              <a:buFont typeface="Wingdings" panose="05000000000000000000" pitchFamily="2" charset="2"/>
+              <a:buChar char="v"/>
+            </a:pPr>
+            <a:r>
+              <a:rPr lang="en-US" sz="2400" dirty="0"/>
+              <a:t>Factory: Use one factory class to create different types of Bike</a:t>
+            </a:r>
+          </a:p>
         </p:txBody>
       </p:sp>
     </p:spTree>
@@ -24128,7 +24620,191 @@
 </p:sld>
 </file>
 
-<file path=ppt/slides/slide13.xml><?xml version="1.0" encoding="utf-8"?>
+<file path=ppt/slides/slide14.xml><?xml version="1.0" encoding="utf-8"?>
+<p:sld xmlns:a="http://schemas.openxmlformats.org/drawingml/2006/main" xmlns:r="http://schemas.openxmlformats.org/officeDocument/2006/relationships" xmlns:p="http://schemas.openxmlformats.org/presentationml/2006/main">
+  <p:cSld>
+    <p:spTree>
+      <p:nvGrpSpPr>
+        <p:cNvPr id="1" name="Shape 1354"/>
+        <p:cNvGrpSpPr/>
+        <p:nvPr/>
+      </p:nvGrpSpPr>
+      <p:grpSpPr>
+        <a:xfrm>
+          <a:off x="0" y="0"/>
+          <a:ext cx="0" cy="0"/>
+          <a:chOff x="0" y="0"/>
+          <a:chExt cx="0" cy="0"/>
+        </a:xfrm>
+      </p:grpSpPr>
+      <p:sp>
+        <p:nvSpPr>
+          <p:cNvPr id="1355" name="Google Shape;1355;p57"/>
+          <p:cNvSpPr txBox="1">
+            <a:spLocks noGrp="1"/>
+          </p:cNvSpPr>
+          <p:nvPr>
+            <p:ph type="title"/>
+          </p:nvPr>
+        </p:nvSpPr>
+        <p:spPr>
+          <a:xfrm>
+            <a:off x="1569450" y="1152050"/>
+            <a:ext cx="6005100" cy="1516800"/>
+          </a:xfrm>
+          <a:prstGeom prst="rect">
+            <a:avLst/>
+          </a:prstGeom>
+        </p:spPr>
+        <p:txBody>
+          <a:bodyPr spcFirstLastPara="1" wrap="square" lIns="91425" tIns="91425" rIns="91425" bIns="91425" anchor="b" anchorCtr="0">
+            <a:noAutofit/>
+          </a:bodyPr>
+          <a:lstStyle/>
+          <a:p>
+            <a:pPr marL="0" lvl="0" indent="0" algn="ctr" rtl="0">
+              <a:spcBef>
+                <a:spcPts val="0"/>
+              </a:spcBef>
+              <a:spcAft>
+                <a:spcPts val="0"/>
+              </a:spcAft>
+              <a:buNone/>
+            </a:pPr>
+            <a:r>
+              <a:rPr lang="en" dirty="0"/>
+              <a:t>Demo</a:t>
+            </a:r>
+            <a:endParaRPr dirty="0"/>
+          </a:p>
+        </p:txBody>
+      </p:sp>
+      <p:sp>
+        <p:nvSpPr>
+          <p:cNvPr id="1356" name="Google Shape;1356;p57"/>
+          <p:cNvSpPr txBox="1">
+            <a:spLocks noGrp="1"/>
+          </p:cNvSpPr>
+          <p:nvPr>
+            <p:ph type="subTitle" idx="1"/>
+          </p:nvPr>
+        </p:nvSpPr>
+        <p:spPr>
+          <a:xfrm>
+            <a:off x="1904250" y="2756350"/>
+            <a:ext cx="5335500" cy="1235100"/>
+          </a:xfrm>
+          <a:prstGeom prst="rect">
+            <a:avLst/>
+          </a:prstGeom>
+        </p:spPr>
+        <p:txBody>
+          <a:bodyPr spcFirstLastPara="1" wrap="square" lIns="91425" tIns="91425" rIns="91425" bIns="91425" anchor="t" anchorCtr="0">
+            <a:noAutofit/>
+          </a:bodyPr>
+          <a:lstStyle/>
+          <a:p>
+            <a:pPr marL="0" lvl="0" indent="0" algn="ctr" rtl="0">
+              <a:spcBef>
+                <a:spcPts val="0"/>
+              </a:spcBef>
+              <a:spcAft>
+                <a:spcPts val="1200"/>
+              </a:spcAft>
+              <a:buClr>
+                <a:schemeClr val="dk1"/>
+              </a:buClr>
+              <a:buSzPts val="1100"/>
+              <a:buFont typeface="Arial"/>
+              <a:buNone/>
+            </a:pPr>
+            <a:r>
+              <a:rPr lang="en-US" dirty="0"/>
+              <a:t>How our </a:t>
+            </a:r>
+            <a:r>
+              <a:rPr lang="en-US"/>
+              <a:t>application functions</a:t>
+            </a:r>
+            <a:endParaRPr lang="en-US" dirty="0"/>
+          </a:p>
+        </p:txBody>
+      </p:sp>
+      <p:sp>
+        <p:nvSpPr>
+          <p:cNvPr id="1357" name="Google Shape;1357;p57"/>
+          <p:cNvSpPr/>
+          <p:nvPr/>
+        </p:nvSpPr>
+        <p:spPr>
+          <a:xfrm>
+            <a:off x="3881688" y="3991450"/>
+            <a:ext cx="1380619" cy="52850"/>
+          </a:xfrm>
+          <a:custGeom>
+            <a:avLst/>
+            <a:gdLst/>
+            <a:ahLst/>
+            <a:cxnLst/>
+            <a:rect l="l" t="t" r="r" b="b"/>
+            <a:pathLst>
+              <a:path w="17505" h="670" extrusionOk="0">
+                <a:moveTo>
+                  <a:pt x="0" y="0"/>
+                </a:moveTo>
+                <a:lnTo>
+                  <a:pt x="0" y="669"/>
+                </a:lnTo>
+                <a:lnTo>
+                  <a:pt x="17505" y="669"/>
+                </a:lnTo>
+                <a:lnTo>
+                  <a:pt x="17505" y="0"/>
+                </a:lnTo>
+                <a:close/>
+              </a:path>
+            </a:pathLst>
+          </a:custGeom>
+          <a:solidFill>
+            <a:schemeClr val="accent2"/>
+          </a:solidFill>
+          <a:ln>
+            <a:noFill/>
+          </a:ln>
+        </p:spPr>
+        <p:txBody>
+          <a:bodyPr spcFirstLastPara="1" wrap="square" lIns="91425" tIns="91425" rIns="91425" bIns="91425" anchor="ctr" anchorCtr="0">
+            <a:noAutofit/>
+          </a:bodyPr>
+          <a:lstStyle/>
+          <a:p>
+            <a:pPr marL="0" lvl="0" indent="0" algn="l" rtl="0">
+              <a:spcBef>
+                <a:spcPts val="0"/>
+              </a:spcBef>
+              <a:spcAft>
+                <a:spcPts val="0"/>
+              </a:spcAft>
+              <a:buNone/>
+            </a:pPr>
+            <a:endParaRPr/>
+          </a:p>
+        </p:txBody>
+      </p:sp>
+    </p:spTree>
+    <p:extLst>
+      <p:ext uri="{BB962C8B-B14F-4D97-AF65-F5344CB8AC3E}">
+        <p14:creationId xmlns:p14="http://schemas.microsoft.com/office/powerpoint/2010/main" val="2304174229"/>
+      </p:ext>
+    </p:extLst>
+  </p:cSld>
+  <p:clrMapOvr>
+    <a:masterClrMapping/>
+  </p:clrMapOvr>
+</p:sld>
+</file>
+
+<file path=ppt/slides/slide15.xml><?xml version="1.0" encoding="utf-8"?>
 <p:sld xmlns:a="http://schemas.openxmlformats.org/drawingml/2006/main" xmlns:r="http://schemas.openxmlformats.org/officeDocument/2006/relationships" xmlns:p="http://schemas.openxmlformats.org/presentationml/2006/main">
   <p:cSld>
     <p:spTree>
@@ -24523,7 +25199,7 @@
           <p:nvPr>
             <p:extLst>
               <p:ext uri="{D42A27DB-BD31-4B8C-83A1-F6EECF244321}">
-                <p14:modId xmlns:p14="http://schemas.microsoft.com/office/powerpoint/2010/main" val="2370894676"/>
+                <p14:modId xmlns:p14="http://schemas.microsoft.com/office/powerpoint/2010/main" val="426440529"/>
               </p:ext>
             </p:extLst>
           </p:nvPr>
@@ -24776,6 +25452,10 @@
                     <a:bodyPr/>
                     <a:lstStyle/>
                     <a:p>
+                      <a:r>
+                        <a:rPr lang="en-US" dirty="0"/>
+                        <a:t>20184248</a:t>
+                      </a:r>
                       <a:endParaRPr lang="vi-VN" dirty="0"/>
                     </a:p>
                   </a:txBody>
@@ -24849,6 +25529,10 @@
                     <a:bodyPr/>
                     <a:lstStyle/>
                     <a:p>
+                      <a:r>
+                        <a:rPr lang="en-US" dirty="0"/>
+                        <a:t>20184284</a:t>
+                      </a:r>
                       <a:endParaRPr lang="vi-VN" dirty="0"/>
                     </a:p>
                   </a:txBody>
@@ -25008,7 +25692,7 @@
             </a:pPr>
             <a:r>
               <a:rPr lang="en-US" sz="4000" dirty="0"/>
-              <a:t>1. Interaction Diagram</a:t>
+              <a:t>1. Class diagrams</a:t>
             </a:r>
           </a:p>
           <a:p>
@@ -25017,7 +25701,7 @@
             </a:pPr>
             <a:r>
               <a:rPr lang="en-US" sz="4000" dirty="0"/>
-              <a:t>2. Class diagrams</a:t>
+              <a:t>2. Design considerations</a:t>
             </a:r>
           </a:p>
           <a:p>
@@ -25026,7 +25710,7 @@
             </a:pPr>
             <a:r>
               <a:rPr lang="en-US" sz="4000" dirty="0"/>
-              <a:t>3. Design considerations</a:t>
+              <a:t>3. Design pattern</a:t>
             </a:r>
           </a:p>
           <a:p>
@@ -25035,7 +25719,7 @@
             </a:pPr>
             <a:r>
               <a:rPr lang="en-US" sz="4000" dirty="0"/>
-              <a:t>4. Design pattern</a:t>
+              <a:t>4. Demo</a:t>
             </a:r>
             <a:endParaRPr sz="4000" dirty="0"/>
           </a:p>
@@ -25092,7 +25776,7 @@
 </file>
 
 <file path=ppt/slides/slide4.xml><?xml version="1.0" encoding="utf-8"?>
-<p:sld xmlns:a="http://schemas.openxmlformats.org/drawingml/2006/main" xmlns:r="http://schemas.openxmlformats.org/officeDocument/2006/relationships" xmlns:p="http://schemas.openxmlformats.org/presentationml/2006/main">
+<p:sld xmlns:a="http://schemas.openxmlformats.org/drawingml/2006/main" xmlns:r="http://schemas.openxmlformats.org/officeDocument/2006/relationships" xmlns:p="http://schemas.openxmlformats.org/presentationml/2006/main" show="0">
   <p:cSld>
     <p:bg>
       <p:bgPr>
@@ -25281,7 +25965,7 @@
 </file>
 
 <file path=ppt/slides/slide5.xml><?xml version="1.0" encoding="utf-8"?>
-<p:sld xmlns:a="http://schemas.openxmlformats.org/drawingml/2006/main" xmlns:r="http://schemas.openxmlformats.org/officeDocument/2006/relationships" xmlns:p="http://schemas.openxmlformats.org/presentationml/2006/main">
+<p:sld xmlns:a="http://schemas.openxmlformats.org/drawingml/2006/main" xmlns:r="http://schemas.openxmlformats.org/officeDocument/2006/relationships" xmlns:p="http://schemas.openxmlformats.org/presentationml/2006/main" show="0">
   <p:cSld>
     <p:spTree>
       <p:nvGrpSpPr>
@@ -25538,10 +26222,10 @@
       </p:grpSpPr>
       <p:pic>
         <p:nvPicPr>
-          <p:cNvPr id="3" name="Picture 2" descr="Diagram&#10;&#10;Description automatically generated">
+          <p:cNvPr id="4" name="Picture 3" descr="Diagram&#10;&#10;Description automatically generated">
             <a:extLst>
               <a:ext uri="{FF2B5EF4-FFF2-40B4-BE49-F238E27FC236}">
-                <a16:creationId xmlns:a16="http://schemas.microsoft.com/office/drawing/2014/main" id="{537E5CE1-415A-465C-ABD3-04E00D4B558B}"/>
+                <a16:creationId xmlns:a16="http://schemas.microsoft.com/office/drawing/2014/main" id="{0202BE31-6A2E-436C-84EA-04EB4352CF2C}"/>
               </a:ext>
             </a:extLst>
           </p:cNvPr>
@@ -25550,15 +26234,16 @@
           </p:cNvPicPr>
           <p:nvPr/>
         </p:nvPicPr>
-        <p:blipFill rotWithShape="1">
+        <p:blipFill>
           <a:blip r:embed="rId3"/>
-          <a:srcRect l="6293" t="1261" r="5730" b="1442"/>
-          <a:stretch/>
+          <a:stretch>
+            <a:fillRect/>
+          </a:stretch>
         </p:blipFill>
         <p:spPr>
           <a:xfrm>
-            <a:off x="667819" y="835417"/>
-            <a:ext cx="8044665" cy="3472665"/>
+            <a:off x="0" y="69614"/>
+            <a:ext cx="9144000" cy="5004272"/>
           </a:xfrm>
           <a:prstGeom prst="rect">
             <a:avLst/>

</xml_diff>